<commit_message>
Done with dummy operations
</commit_message>
<xml_diff>
--- a/Gantt001.pptx
+++ b/Gantt001.pptx
@@ -104,6 +104,11 @@
       </a:defRPr>
     </a:lvl9pPr>
   </p:defaultTextStyle>
+  <p:extLst>
+    <p:ext uri="{EFAFB233-063F-42B5-8137-9DF3F51BA10A}">
+      <p15:sldGuideLst xmlns:p15="http://schemas.microsoft.com/office/powerpoint/2012/main"/>
+    </p:ext>
+  </p:extLst>
 </p:presentation>
 </file>
 
@@ -254,7 +259,7 @@
           <a:p>
             <a:fld id="{5F48338C-5D54-467B-87FE-765AF81A82C2}" type="datetimeFigureOut">
               <a:rPr lang="zh-TW" altLang="en-US" smtClean="0"/>
-              <a:t>2023/4/7</a:t>
+              <a:t>2023/4/8</a:t>
             </a:fld>
             <a:endParaRPr lang="zh-TW" altLang="en-US"/>
           </a:p>
@@ -452,7 +457,7 @@
           <a:p>
             <a:fld id="{5F48338C-5D54-467B-87FE-765AF81A82C2}" type="datetimeFigureOut">
               <a:rPr lang="zh-TW" altLang="en-US" smtClean="0"/>
-              <a:t>2023/4/7</a:t>
+              <a:t>2023/4/8</a:t>
             </a:fld>
             <a:endParaRPr lang="zh-TW" altLang="en-US"/>
           </a:p>
@@ -660,7 +665,7 @@
           <a:p>
             <a:fld id="{5F48338C-5D54-467B-87FE-765AF81A82C2}" type="datetimeFigureOut">
               <a:rPr lang="zh-TW" altLang="en-US" smtClean="0"/>
-              <a:t>2023/4/7</a:t>
+              <a:t>2023/4/8</a:t>
             </a:fld>
             <a:endParaRPr lang="zh-TW" altLang="en-US"/>
           </a:p>
@@ -858,7 +863,7 @@
           <a:p>
             <a:fld id="{5F48338C-5D54-467B-87FE-765AF81A82C2}" type="datetimeFigureOut">
               <a:rPr lang="zh-TW" altLang="en-US" smtClean="0"/>
-              <a:t>2023/4/7</a:t>
+              <a:t>2023/4/8</a:t>
             </a:fld>
             <a:endParaRPr lang="zh-TW" altLang="en-US"/>
           </a:p>
@@ -1133,7 +1138,7 @@
           <a:p>
             <a:fld id="{5F48338C-5D54-467B-87FE-765AF81A82C2}" type="datetimeFigureOut">
               <a:rPr lang="zh-TW" altLang="en-US" smtClean="0"/>
-              <a:t>2023/4/7</a:t>
+              <a:t>2023/4/8</a:t>
             </a:fld>
             <a:endParaRPr lang="zh-TW" altLang="en-US"/>
           </a:p>
@@ -1398,7 +1403,7 @@
           <a:p>
             <a:fld id="{5F48338C-5D54-467B-87FE-765AF81A82C2}" type="datetimeFigureOut">
               <a:rPr lang="zh-TW" altLang="en-US" smtClean="0"/>
-              <a:t>2023/4/7</a:t>
+              <a:t>2023/4/8</a:t>
             </a:fld>
             <a:endParaRPr lang="zh-TW" altLang="en-US"/>
           </a:p>
@@ -1810,7 +1815,7 @@
           <a:p>
             <a:fld id="{5F48338C-5D54-467B-87FE-765AF81A82C2}" type="datetimeFigureOut">
               <a:rPr lang="zh-TW" altLang="en-US" smtClean="0"/>
-              <a:t>2023/4/7</a:t>
+              <a:t>2023/4/8</a:t>
             </a:fld>
             <a:endParaRPr lang="zh-TW" altLang="en-US"/>
           </a:p>
@@ -1951,7 +1956,7 @@
           <a:p>
             <a:fld id="{5F48338C-5D54-467B-87FE-765AF81A82C2}" type="datetimeFigureOut">
               <a:rPr lang="zh-TW" altLang="en-US" smtClean="0"/>
-              <a:t>2023/4/7</a:t>
+              <a:t>2023/4/8</a:t>
             </a:fld>
             <a:endParaRPr lang="zh-TW" altLang="en-US"/>
           </a:p>
@@ -2064,7 +2069,7 @@
           <a:p>
             <a:fld id="{5F48338C-5D54-467B-87FE-765AF81A82C2}" type="datetimeFigureOut">
               <a:rPr lang="zh-TW" altLang="en-US" smtClean="0"/>
-              <a:t>2023/4/7</a:t>
+              <a:t>2023/4/8</a:t>
             </a:fld>
             <a:endParaRPr lang="zh-TW" altLang="en-US"/>
           </a:p>
@@ -2375,7 +2380,7 @@
           <a:p>
             <a:fld id="{5F48338C-5D54-467B-87FE-765AF81A82C2}" type="datetimeFigureOut">
               <a:rPr lang="zh-TW" altLang="en-US" smtClean="0"/>
-              <a:t>2023/4/7</a:t>
+              <a:t>2023/4/8</a:t>
             </a:fld>
             <a:endParaRPr lang="zh-TW" altLang="en-US"/>
           </a:p>
@@ -2663,7 +2668,7 @@
           <a:p>
             <a:fld id="{5F48338C-5D54-467B-87FE-765AF81A82C2}" type="datetimeFigureOut">
               <a:rPr lang="zh-TW" altLang="en-US" smtClean="0"/>
-              <a:t>2023/4/7</a:t>
+              <a:t>2023/4/8</a:t>
             </a:fld>
             <a:endParaRPr lang="zh-TW" altLang="en-US"/>
           </a:p>
@@ -2904,7 +2909,7 @@
           <a:p>
             <a:fld id="{5F48338C-5D54-467B-87FE-765AF81A82C2}" type="datetimeFigureOut">
               <a:rPr lang="zh-TW" altLang="en-US" smtClean="0"/>
-              <a:t>2023/4/7</a:t>
+              <a:t>2023/4/8</a:t>
             </a:fld>
             <a:endParaRPr lang="zh-TW" altLang="en-US"/>
           </a:p>
@@ -3335,7 +3340,7 @@
         </p:nvGrpSpPr>
         <p:grpSpPr>
           <a:xfrm>
-            <a:off x="696286" y="1364610"/>
+            <a:off x="1835769" y="1702235"/>
             <a:ext cx="9903203" cy="2550253"/>
             <a:chOff x="696286" y="1364610"/>
             <a:chExt cx="9903203" cy="2550253"/>
@@ -3566,7 +3571,8 @@
             <a:ln>
               <a:solidFill>
                 <a:schemeClr val="accent2">
-                  <a:lumMod val="75000"/>
+                  <a:lumMod val="60000"/>
+                  <a:lumOff val="40000"/>
                 </a:schemeClr>
               </a:solidFill>
             </a:ln>
@@ -4109,7 +4115,10 @@
             </a:prstGeom>
             <a:ln>
               <a:solidFill>
-                <a:srgbClr val="FF0000"/>
+                <a:schemeClr val="accent2">
+                  <a:lumMod val="60000"/>
+                  <a:lumOff val="40000"/>
+                </a:schemeClr>
               </a:solidFill>
             </a:ln>
           </p:spPr>
@@ -4388,7 +4397,10 @@
             </a:prstGeom>
             <a:ln>
               <a:solidFill>
-                <a:srgbClr val="FF0000"/>
+                <a:schemeClr val="accent2">
+                  <a:lumMod val="60000"/>
+                  <a:lumOff val="40000"/>
+                </a:schemeClr>
               </a:solidFill>
             </a:ln>
           </p:spPr>
@@ -5011,7 +5023,10 @@
             </a:prstGeom>
             <a:ln>
               <a:solidFill>
-                <a:srgbClr val="FF0000"/>
+                <a:schemeClr val="accent2">
+                  <a:lumMod val="60000"/>
+                  <a:lumOff val="40000"/>
+                </a:schemeClr>
               </a:solidFill>
             </a:ln>
           </p:spPr>
@@ -5244,7 +5259,10 @@
             </a:prstGeom>
             <a:ln>
               <a:solidFill>
-                <a:srgbClr val="FF0000"/>
+                <a:schemeClr val="accent2">
+                  <a:lumMod val="60000"/>
+                  <a:lumOff val="40000"/>
+                </a:schemeClr>
               </a:solidFill>
             </a:ln>
           </p:spPr>
@@ -5905,7 +5923,10 @@
             </a:prstGeom>
             <a:ln>
               <a:solidFill>
-                <a:srgbClr val="FF0000"/>
+                <a:schemeClr val="accent2">
+                  <a:lumMod val="60000"/>
+                  <a:lumOff val="40000"/>
+                </a:schemeClr>
               </a:solidFill>
             </a:ln>
           </p:spPr>
@@ -6091,7 +6112,7 @@
         </p:nvSpPr>
         <p:spPr>
           <a:xfrm>
-            <a:off x="696270" y="3297380"/>
+            <a:off x="3270997" y="3622232"/>
             <a:ext cx="1004674" cy="617483"/>
           </a:xfrm>
           <a:prstGeom prst="rect">
@@ -6136,7 +6157,7 @@
                 </a:solidFill>
                 <a:latin typeface="Consolas" panose="020B0609020204030204" pitchFamily="49" charset="0"/>
               </a:rPr>
-              <a:t>0-7 (7)</a:t>
+              <a:t>10-17 (7)</a:t>
             </a:r>
             <a:endParaRPr lang="zh-TW" altLang="en-US" sz="900" dirty="0"/>
           </a:p>
@@ -6156,7 +6177,7 @@
         </p:nvSpPr>
         <p:spPr>
           <a:xfrm>
-            <a:off x="1708045" y="2362968"/>
+            <a:off x="4283609" y="2746842"/>
             <a:ext cx="1004674" cy="639492"/>
           </a:xfrm>
           <a:prstGeom prst="rect">
@@ -6201,7 +6222,7 @@
                 </a:solidFill>
                 <a:latin typeface="Consolas" panose="020B0609020204030204" pitchFamily="49" charset="0"/>
               </a:rPr>
-              <a:t>7-14(7)</a:t>
+              <a:t>17-24(7)</a:t>
             </a:r>
             <a:endParaRPr lang="zh-TW" altLang="en-US" sz="900" dirty="0"/>
           </a:p>
@@ -6221,8 +6242,8 @@
         </p:nvSpPr>
         <p:spPr>
           <a:xfrm>
-            <a:off x="3726654" y="1364610"/>
-            <a:ext cx="1976664" cy="709448"/>
+            <a:off x="7134194" y="1751864"/>
+            <a:ext cx="1447250" cy="709448"/>
           </a:xfrm>
           <a:prstGeom prst="rect">
             <a:avLst/>
@@ -6266,7 +6287,7 @@
                 </a:solidFill>
                 <a:latin typeface="Consolas" panose="020B0609020204030204" pitchFamily="49" charset="0"/>
               </a:rPr>
-              <a:t>21-31-(10)</a:t>
+              <a:t>37-47-(10)</a:t>
             </a:r>
             <a:endParaRPr lang="zh-TW" altLang="en-US" sz="900" dirty="0"/>
           </a:p>
@@ -6286,8 +6307,8 @@
         </p:nvSpPr>
         <p:spPr>
           <a:xfrm>
-            <a:off x="2563273" y="3310153"/>
-            <a:ext cx="2261348" cy="617483"/>
+            <a:off x="5871995" y="3635005"/>
+            <a:ext cx="2278874" cy="617483"/>
           </a:xfrm>
           <a:prstGeom prst="rect">
             <a:avLst/>
@@ -6337,7 +6358,7 @@
                 </a:solidFill>
                 <a:latin typeface="Consolas" panose="020B0609020204030204" pitchFamily="49" charset="0"/>
               </a:rPr>
-              <a:t>13-29 (16)</a:t>
+              <a:t>28-44 (16)</a:t>
             </a:r>
             <a:endParaRPr lang="zh-TW" altLang="en-US" sz="900" dirty="0"/>
           </a:p>
@@ -6357,7 +6378,7 @@
         </p:nvSpPr>
         <p:spPr>
           <a:xfrm>
-            <a:off x="682402" y="1364610"/>
+            <a:off x="4135820" y="1751864"/>
             <a:ext cx="1736175" cy="639493"/>
           </a:xfrm>
           <a:prstGeom prst="rect">
@@ -6408,7 +6429,7 @@
                 </a:solidFill>
                 <a:latin typeface="Consolas" panose="020B0609020204030204" pitchFamily="49" charset="0"/>
               </a:rPr>
-              <a:t>0-12 (12)</a:t>
+              <a:t>16-28 (12)</a:t>
             </a:r>
             <a:endParaRPr lang="zh-TW" altLang="en-US" sz="900" dirty="0"/>
           </a:p>
@@ -6428,7 +6449,7 @@
         </p:nvSpPr>
         <p:spPr>
           <a:xfrm>
-            <a:off x="1691689" y="3465075"/>
+            <a:off x="4801901" y="3730318"/>
             <a:ext cx="851902" cy="397458"/>
           </a:xfrm>
           <a:prstGeom prst="rect">
@@ -6469,7 +6490,7 @@
                 </a:solidFill>
                 <a:latin typeface="Consolas" panose="020B0609020204030204" pitchFamily="49" charset="0"/>
               </a:rPr>
-              <a:t>0</a:t>
+              <a:t>0 &lt;2-4&gt;</a:t>
             </a:r>
           </a:p>
           <a:p>
@@ -6481,7 +6502,7 @@
                 </a:solidFill>
                 <a:latin typeface="Consolas" panose="020B0609020204030204" pitchFamily="49" charset="0"/>
               </a:rPr>
-              <a:t>2-4 (6)</a:t>
+              <a:t>(6)</a:t>
             </a:r>
             <a:endParaRPr lang="zh-TW" altLang="en-US" sz="900" dirty="0"/>
           </a:p>
@@ -6501,8 +6522,8 @@
         </p:nvSpPr>
         <p:spPr>
           <a:xfrm>
-            <a:off x="2432461" y="1546192"/>
-            <a:ext cx="1294193" cy="397458"/>
+            <a:off x="5859994" y="1907859"/>
+            <a:ext cx="1274199" cy="397458"/>
           </a:xfrm>
           <a:prstGeom prst="rect">
             <a:avLst/>
@@ -6542,7 +6563,7 @@
                 </a:solidFill>
                 <a:latin typeface="Consolas" panose="020B0609020204030204" pitchFamily="49" charset="0"/>
               </a:rPr>
-              <a:t>2</a:t>
+              <a:t>2 &lt;1-2&gt;</a:t>
             </a:r>
           </a:p>
           <a:p>
@@ -6554,9 +6575,359 @@
                 </a:solidFill>
                 <a:latin typeface="Consolas" panose="020B0609020204030204" pitchFamily="49" charset="0"/>
               </a:rPr>
-              <a:t>1-2 (9)</a:t>
+              <a:t> (9)</a:t>
             </a:r>
             <a:endParaRPr lang="zh-TW" altLang="en-US" sz="900" dirty="0"/>
+          </a:p>
+        </p:txBody>
+      </p:sp>
+      <p:sp>
+        <p:nvSpPr>
+          <p:cNvPr id="84" name="矩形 83">
+            <a:extLst>
+              <a:ext uri="{FF2B5EF4-FFF2-40B4-BE49-F238E27FC236}">
+                <a16:creationId xmlns:a16="http://schemas.microsoft.com/office/drawing/2014/main" id="{CB8120F6-B6E9-4C20-8441-CCAC1FBC0E13}"/>
+              </a:ext>
+            </a:extLst>
+          </p:cNvPr>
+          <p:cNvSpPr/>
+          <p:nvPr/>
+        </p:nvSpPr>
+        <p:spPr>
+          <a:xfrm>
+            <a:off x="1822302" y="3732244"/>
+            <a:ext cx="1435781" cy="397458"/>
+          </a:xfrm>
+          <a:prstGeom prst="rect">
+            <a:avLst/>
+          </a:prstGeom>
+          <a:solidFill>
+            <a:schemeClr val="bg2">
+              <a:lumMod val="90000"/>
+            </a:schemeClr>
+          </a:solidFill>
+          <a:ln>
+            <a:noFill/>
+          </a:ln>
+        </p:spPr>
+        <p:style>
+          <a:lnRef idx="2">
+            <a:schemeClr val="accent1"/>
+          </a:lnRef>
+          <a:fillRef idx="1">
+            <a:schemeClr val="lt1"/>
+          </a:fillRef>
+          <a:effectRef idx="0">
+            <a:schemeClr val="accent1"/>
+          </a:effectRef>
+          <a:fontRef idx="minor">
+            <a:schemeClr val="dk1"/>
+          </a:fontRef>
+        </p:style>
+        <p:txBody>
+          <a:bodyPr rtlCol="0" anchor="ctr"/>
+          <a:lstStyle/>
+          <a:p>
+            <a:pPr algn="ctr"/>
+            <a:r>
+              <a:rPr lang="en-US" altLang="zh-TW" sz="900" dirty="0">
+                <a:solidFill>
+                  <a:srgbClr val="0000FF"/>
+                </a:solidFill>
+                <a:latin typeface="Consolas" panose="020B0609020204030204" pitchFamily="49" charset="0"/>
+              </a:rPr>
+              <a:t>0 &lt;0-1&gt;</a:t>
+            </a:r>
+          </a:p>
+          <a:p>
+            <a:pPr algn="ctr"/>
+            <a:r>
+              <a:rPr lang="en-US" altLang="zh-TW" sz="900" dirty="0">
+                <a:solidFill>
+                  <a:srgbClr val="0000FF"/>
+                </a:solidFill>
+                <a:latin typeface="Consolas" panose="020B0609020204030204" pitchFamily="49" charset="0"/>
+              </a:rPr>
+              <a:t> (10)</a:t>
+            </a:r>
+            <a:endParaRPr lang="zh-TW" altLang="en-US" sz="900" dirty="0"/>
+          </a:p>
+        </p:txBody>
+      </p:sp>
+      <p:sp>
+        <p:nvSpPr>
+          <p:cNvPr id="85" name="矩形 84">
+            <a:extLst>
+              <a:ext uri="{FF2B5EF4-FFF2-40B4-BE49-F238E27FC236}">
+                <a16:creationId xmlns:a16="http://schemas.microsoft.com/office/drawing/2014/main" id="{B15A1476-3325-45AF-8F28-F5DE0663C11E}"/>
+              </a:ext>
+            </a:extLst>
+          </p:cNvPr>
+          <p:cNvSpPr/>
+          <p:nvPr/>
+        </p:nvSpPr>
+        <p:spPr>
+          <a:xfrm>
+            <a:off x="1822302" y="1872881"/>
+            <a:ext cx="2313518" cy="397458"/>
+          </a:xfrm>
+          <a:prstGeom prst="rect">
+            <a:avLst/>
+          </a:prstGeom>
+          <a:solidFill>
+            <a:schemeClr val="bg2">
+              <a:lumMod val="90000"/>
+            </a:schemeClr>
+          </a:solidFill>
+          <a:ln>
+            <a:noFill/>
+          </a:ln>
+        </p:spPr>
+        <p:style>
+          <a:lnRef idx="2">
+            <a:schemeClr val="accent1"/>
+          </a:lnRef>
+          <a:fillRef idx="1">
+            <a:schemeClr val="lt1"/>
+          </a:fillRef>
+          <a:effectRef idx="0">
+            <a:schemeClr val="accent1"/>
+          </a:effectRef>
+          <a:fontRef idx="minor">
+            <a:schemeClr val="dk1"/>
+          </a:fontRef>
+        </p:style>
+        <p:txBody>
+          <a:bodyPr rtlCol="0" anchor="ctr"/>
+          <a:lstStyle/>
+          <a:p>
+            <a:pPr algn="ctr"/>
+            <a:r>
+              <a:rPr lang="en-US" altLang="zh-TW" sz="900" dirty="0">
+                <a:solidFill>
+                  <a:srgbClr val="0000FF"/>
+                </a:solidFill>
+                <a:latin typeface="Consolas" panose="020B0609020204030204" pitchFamily="49" charset="0"/>
+              </a:rPr>
+              <a:t>2 &lt;0-3&gt;</a:t>
+            </a:r>
+          </a:p>
+          <a:p>
+            <a:pPr algn="ctr"/>
+            <a:r>
+              <a:rPr lang="en-US" altLang="zh-TW" sz="900" dirty="0">
+                <a:solidFill>
+                  <a:srgbClr val="0000FF"/>
+                </a:solidFill>
+                <a:latin typeface="Consolas" panose="020B0609020204030204" pitchFamily="49" charset="0"/>
+              </a:rPr>
+              <a:t> (16)</a:t>
+            </a:r>
+            <a:endParaRPr lang="zh-TW" altLang="en-US" sz="900" dirty="0"/>
+          </a:p>
+        </p:txBody>
+      </p:sp>
+      <p:sp>
+        <p:nvSpPr>
+          <p:cNvPr id="86" name="矩形 85">
+            <a:extLst>
+              <a:ext uri="{FF2B5EF4-FFF2-40B4-BE49-F238E27FC236}">
+                <a16:creationId xmlns:a16="http://schemas.microsoft.com/office/drawing/2014/main" id="{D4E17377-48B4-44DD-A2CF-0FD92588B12C}"/>
+              </a:ext>
+            </a:extLst>
+          </p:cNvPr>
+          <p:cNvSpPr/>
+          <p:nvPr/>
+        </p:nvSpPr>
+        <p:spPr>
+          <a:xfrm>
+            <a:off x="1943650" y="2787448"/>
+            <a:ext cx="697128" cy="397458"/>
+          </a:xfrm>
+          <a:prstGeom prst="rect">
+            <a:avLst/>
+          </a:prstGeom>
+          <a:solidFill>
+            <a:schemeClr val="bg2">
+              <a:lumMod val="90000"/>
+            </a:schemeClr>
+          </a:solidFill>
+          <a:ln>
+            <a:noFill/>
+          </a:ln>
+        </p:spPr>
+        <p:style>
+          <a:lnRef idx="2">
+            <a:schemeClr val="accent1"/>
+          </a:lnRef>
+          <a:fillRef idx="1">
+            <a:schemeClr val="lt1"/>
+          </a:fillRef>
+          <a:effectRef idx="0">
+            <a:schemeClr val="accent1"/>
+          </a:effectRef>
+          <a:fontRef idx="minor">
+            <a:schemeClr val="dk1"/>
+          </a:fontRef>
+        </p:style>
+        <p:txBody>
+          <a:bodyPr rtlCol="0" anchor="ctr"/>
+          <a:lstStyle/>
+          <a:p>
+            <a:pPr algn="ctr"/>
+            <a:r>
+              <a:rPr lang="en-US" altLang="zh-TW" sz="900" dirty="0">
+                <a:solidFill>
+                  <a:srgbClr val="0000FF"/>
+                </a:solidFill>
+                <a:latin typeface="Consolas" panose="020B0609020204030204" pitchFamily="49" charset="0"/>
+              </a:rPr>
+              <a:t>1 &lt;0-0&gt; (0)</a:t>
+            </a:r>
+            <a:endParaRPr lang="zh-TW" altLang="en-US" sz="900" dirty="0"/>
+          </a:p>
+        </p:txBody>
+      </p:sp>
+      <p:sp>
+        <p:nvSpPr>
+          <p:cNvPr id="87" name="文字方塊 86">
+            <a:extLst>
+              <a:ext uri="{FF2B5EF4-FFF2-40B4-BE49-F238E27FC236}">
+                <a16:creationId xmlns:a16="http://schemas.microsoft.com/office/drawing/2014/main" id="{F2787DD8-B2EA-49F3-B9DB-A7FB028809EA}"/>
+              </a:ext>
+            </a:extLst>
+          </p:cNvPr>
+          <p:cNvSpPr txBox="1"/>
+          <p:nvPr/>
+        </p:nvSpPr>
+        <p:spPr>
+          <a:xfrm>
+            <a:off x="5791397" y="1009843"/>
+            <a:ext cx="1236020" cy="369332"/>
+          </a:xfrm>
+          <a:prstGeom prst="rect">
+            <a:avLst/>
+          </a:prstGeom>
+          <a:noFill/>
+        </p:spPr>
+        <p:txBody>
+          <a:bodyPr wrap="square">
+            <a:spAutoFit/>
+          </a:bodyPr>
+          <a:lstStyle/>
+          <a:p>
+            <a:r>
+              <a:rPr lang="zh-TW" altLang="en-US" dirty="0"/>
+              <a:t>FTNSP001</a:t>
+            </a:r>
+          </a:p>
+        </p:txBody>
+      </p:sp>
+      <p:sp>
+        <p:nvSpPr>
+          <p:cNvPr id="88" name="文字方塊 87">
+            <a:extLst>
+              <a:ext uri="{FF2B5EF4-FFF2-40B4-BE49-F238E27FC236}">
+                <a16:creationId xmlns:a16="http://schemas.microsoft.com/office/drawing/2014/main" id="{A093C923-43A5-44D4-9690-70757CDF791C}"/>
+              </a:ext>
+            </a:extLst>
+          </p:cNvPr>
+          <p:cNvSpPr txBox="1"/>
+          <p:nvPr/>
+        </p:nvSpPr>
+        <p:spPr>
+          <a:xfrm>
+            <a:off x="773722" y="3766625"/>
+            <a:ext cx="889553" cy="369332"/>
+          </a:xfrm>
+          <a:prstGeom prst="rect">
+            <a:avLst/>
+          </a:prstGeom>
+          <a:noFill/>
+        </p:spPr>
+        <p:txBody>
+          <a:bodyPr wrap="square">
+            <a:spAutoFit/>
+          </a:bodyPr>
+          <a:lstStyle/>
+          <a:p>
+            <a:r>
+              <a:rPr lang="en-US" altLang="zh-TW" dirty="0"/>
+              <a:t>Node 0</a:t>
+            </a:r>
+            <a:endParaRPr lang="zh-TW" altLang="en-US" dirty="0"/>
+          </a:p>
+        </p:txBody>
+      </p:sp>
+      <p:sp>
+        <p:nvSpPr>
+          <p:cNvPr id="89" name="文字方塊 88">
+            <a:extLst>
+              <a:ext uri="{FF2B5EF4-FFF2-40B4-BE49-F238E27FC236}">
+                <a16:creationId xmlns:a16="http://schemas.microsoft.com/office/drawing/2014/main" id="{2D907827-E6D8-45B4-994C-4E1209250AAD}"/>
+              </a:ext>
+            </a:extLst>
+          </p:cNvPr>
+          <p:cNvSpPr txBox="1"/>
+          <p:nvPr/>
+        </p:nvSpPr>
+        <p:spPr>
+          <a:xfrm>
+            <a:off x="743577" y="2792695"/>
+            <a:ext cx="889553" cy="369332"/>
+          </a:xfrm>
+          <a:prstGeom prst="rect">
+            <a:avLst/>
+          </a:prstGeom>
+          <a:noFill/>
+        </p:spPr>
+        <p:txBody>
+          <a:bodyPr wrap="square">
+            <a:spAutoFit/>
+          </a:bodyPr>
+          <a:lstStyle/>
+          <a:p>
+            <a:r>
+              <a:rPr lang="en-US" altLang="zh-TW" dirty="0"/>
+              <a:t>Node 1</a:t>
+            </a:r>
+            <a:endParaRPr lang="zh-TW" altLang="en-US" dirty="0"/>
+          </a:p>
+        </p:txBody>
+      </p:sp>
+      <p:sp>
+        <p:nvSpPr>
+          <p:cNvPr id="90" name="文字方塊 89">
+            <a:extLst>
+              <a:ext uri="{FF2B5EF4-FFF2-40B4-BE49-F238E27FC236}">
+                <a16:creationId xmlns:a16="http://schemas.microsoft.com/office/drawing/2014/main" id="{F8D5A2AE-DB0E-44BC-A391-C1DF0638FD68}"/>
+              </a:ext>
+            </a:extLst>
+          </p:cNvPr>
+          <p:cNvSpPr txBox="1"/>
+          <p:nvPr/>
+        </p:nvSpPr>
+        <p:spPr>
+          <a:xfrm>
+            <a:off x="785776" y="1907859"/>
+            <a:ext cx="889553" cy="369332"/>
+          </a:xfrm>
+          <a:prstGeom prst="rect">
+            <a:avLst/>
+          </a:prstGeom>
+          <a:noFill/>
+        </p:spPr>
+        <p:txBody>
+          <a:bodyPr wrap="square">
+            <a:spAutoFit/>
+          </a:bodyPr>
+          <a:lstStyle/>
+          <a:p>
+            <a:r>
+              <a:rPr lang="en-US" altLang="zh-TW" dirty="0"/>
+              <a:t>Node 2</a:t>
+            </a:r>
+            <a:endParaRPr lang="zh-TW" altLang="en-US" dirty="0"/>
           </a:p>
         </p:txBody>
       </p:sp>

</xml_diff>